<commit_message>
Minor bug when inserting like and dislike where webpage was stuck waiting for a response that wasn't going to ever come.
</commit_message>
<xml_diff>
--- a/data/Progress Presentation/Z Squared Progress Presentation.pptx
+++ b/data/Progress Presentation/Z Squared Progress Presentation.pptx
@@ -104,6 +104,11 @@
       </a:defRPr>
     </a:lvl9pPr>
   </p:defaultTextStyle>
+  <p:extLst>
+    <p:ext uri="{EFAFB233-063F-42B5-8137-9DF3F51BA10A}">
+      <p15:sldGuideLst xmlns:p15="http://schemas.microsoft.com/office/powerpoint/2012/main"/>
+    </p:ext>
+  </p:extLst>
 </p:presentation>
 </file>
 
@@ -3391,7 +3396,7 @@
         <p:spPr>
           <a:xfrm>
             <a:off x="5854044" y="884903"/>
-            <a:ext cx="6337955" cy="2031325"/>
+            <a:ext cx="6337955" cy="2587551"/>
           </a:xfrm>
         </p:spPr>
         <p:txBody>
@@ -3401,6 +3406,20 @@
           <a:lstStyle/>
           <a:p>
             <a:pPr marL="342900" indent="-342900" algn="l">
+              <a:buFont typeface="Arial" panose="020B0604020202020204" pitchFamily="34" charset="0"/>
+              <a:buChar char="•"/>
+            </a:pPr>
+            <a:r>
+              <a:rPr lang="en-US" sz="2000" dirty="0">
+                <a:solidFill>
+                  <a:schemeClr val="bg1"/>
+                </a:solidFill>
+              </a:rPr>
+              <a:t>New Tables</a:t>
+            </a:r>
+          </a:p>
+          <a:p>
+            <a:pPr marL="800100" lvl="1" indent="-342900" algn="l">
               <a:buFont typeface="Arial" panose="020B0604020202020204" pitchFamily="34" charset="0"/>
               <a:buChar char="•"/>
             </a:pPr>
@@ -3410,7 +3429,49 @@
                   <a:schemeClr val="bg1"/>
                 </a:solidFill>
               </a:rPr>
-              <a:t>New Tables</a:t>
+              <a:t>Likes table tracks who’s liked what video(s)</a:t>
+            </a:r>
+          </a:p>
+          <a:p>
+            <a:pPr marL="800100" lvl="1" indent="-342900" algn="l">
+              <a:buFont typeface="Arial" panose="020B0604020202020204" pitchFamily="34" charset="0"/>
+              <a:buChar char="•"/>
+            </a:pPr>
+            <a:r>
+              <a:rPr lang="en-US" sz="1800" dirty="0">
+                <a:solidFill>
+                  <a:schemeClr val="bg1"/>
+                </a:solidFill>
+              </a:rPr>
+              <a:t>Dislikes table tracks who’s dislikes what video(s)</a:t>
+            </a:r>
+          </a:p>
+          <a:p>
+            <a:pPr marL="800100" lvl="1" indent="-342900" algn="l">
+              <a:buFont typeface="Arial" panose="020B0604020202020204" pitchFamily="34" charset="0"/>
+              <a:buChar char="•"/>
+            </a:pPr>
+            <a:r>
+              <a:rPr lang="en-US" sz="1800" dirty="0">
+                <a:solidFill>
+                  <a:schemeClr val="bg1"/>
+                </a:solidFill>
+              </a:rPr>
+              <a:t>Comments table tracks who’s commented on what.</a:t>
+            </a:r>
+          </a:p>
+          <a:p>
+            <a:pPr marL="342900" indent="-342900" algn="l">
+              <a:buFont typeface="Arial" panose="020B0604020202020204" pitchFamily="34" charset="0"/>
+              <a:buChar char="•"/>
+            </a:pPr>
+            <a:r>
+              <a:rPr lang="en-US" sz="2000" dirty="0">
+                <a:solidFill>
+                  <a:schemeClr val="bg1"/>
+                </a:solidFill>
+              </a:rPr>
+              <a:t>New interactions</a:t>
             </a:r>
           </a:p>
           <a:p>
@@ -3424,63 +3485,7 @@
                   <a:schemeClr val="bg1"/>
                 </a:solidFill>
               </a:rPr>
-              <a:t>Likes table tracks who’s liked what video(s)</a:t>
-            </a:r>
-          </a:p>
-          <a:p>
-            <a:pPr marL="800100" lvl="1" indent="-342900" algn="l">
-              <a:buFont typeface="Arial" panose="020B0604020202020204" pitchFamily="34" charset="0"/>
-              <a:buChar char="•"/>
-            </a:pPr>
-            <a:r>
-              <a:rPr lang="en-US" sz="1600" dirty="0">
-                <a:solidFill>
-                  <a:schemeClr val="bg1"/>
-                </a:solidFill>
-              </a:rPr>
-              <a:t>Dislikes table tracks who’s dislikes what video(s)</a:t>
-            </a:r>
-          </a:p>
-          <a:p>
-            <a:pPr marL="800100" lvl="1" indent="-342900" algn="l">
-              <a:buFont typeface="Arial" panose="020B0604020202020204" pitchFamily="34" charset="0"/>
-              <a:buChar char="•"/>
-            </a:pPr>
-            <a:r>
-              <a:rPr lang="en-US" sz="1600" dirty="0">
-                <a:solidFill>
-                  <a:schemeClr val="bg1"/>
-                </a:solidFill>
-              </a:rPr>
-              <a:t>Comments table tracks who’s commented on what.</a:t>
-            </a:r>
-          </a:p>
-          <a:p>
-            <a:pPr marL="342900" indent="-342900" algn="l">
-              <a:buFont typeface="Arial" panose="020B0604020202020204" pitchFamily="34" charset="0"/>
-              <a:buChar char="•"/>
-            </a:pPr>
-            <a:r>
-              <a:rPr lang="en-US" sz="1800" dirty="0">
-                <a:solidFill>
-                  <a:schemeClr val="bg1"/>
-                </a:solidFill>
-              </a:rPr>
-              <a:t>New interactions</a:t>
-            </a:r>
-          </a:p>
-          <a:p>
-            <a:pPr marL="800100" lvl="1" indent="-342900" algn="l">
-              <a:buFont typeface="Arial" panose="020B0604020202020204" pitchFamily="34" charset="0"/>
-              <a:buChar char="•"/>
-            </a:pPr>
-            <a:r>
-              <a:rPr lang="en-US" sz="1600" dirty="0">
-                <a:solidFill>
-                  <a:schemeClr val="bg1"/>
-                </a:solidFill>
-              </a:rPr>
-              <a:t>Session generated to retain login between pages</a:t>
+              <a:t>Session retains login between pages</a:t>
             </a:r>
           </a:p>
           <a:p>
@@ -3525,6 +3530,20 @@
               <a:t>Can view all liked videos through liked videos tab</a:t>
             </a:r>
           </a:p>
+          <a:p>
+            <a:pPr marL="800100" lvl="1" indent="-342900" algn="l">
+              <a:buFont typeface="Arial" panose="020B0604020202020204" pitchFamily="34" charset="0"/>
+              <a:buChar char="•"/>
+            </a:pPr>
+            <a:r>
+              <a:rPr lang="en-US" sz="1600" dirty="0">
+                <a:solidFill>
+                  <a:schemeClr val="bg1"/>
+                </a:solidFill>
+              </a:rPr>
+              <a:t>Videos display in the player with their comments</a:t>
+            </a:r>
+          </a:p>
         </p:txBody>
       </p:sp>
       <p:sp>
@@ -3541,8 +3560,8 @@
         </p:nvSpPr>
         <p:spPr>
           <a:xfrm>
-            <a:off x="6671810" y="2916228"/>
-            <a:ext cx="5520190" cy="1908215"/>
+            <a:off x="5854039" y="3472455"/>
+            <a:ext cx="6337961" cy="1908215"/>
           </a:xfrm>
           <a:prstGeom prst="rect">
             <a:avLst/>
@@ -3572,7 +3591,7 @@
             </a:endParaRPr>
           </a:p>
           <a:p>
-            <a:pPr marL="342900" indent="-342900">
+            <a:pPr marL="800100" lvl="1" indent="-342900">
               <a:buFont typeface="+mj-lt"/>
               <a:buAutoNum type="arabicPeriod"/>
             </a:pPr>
@@ -3586,7 +3605,7 @@
             </a:r>
           </a:p>
           <a:p>
-            <a:pPr marL="342900" indent="-342900">
+            <a:pPr marL="800100" lvl="1" indent="-342900">
               <a:buFont typeface="+mj-lt"/>
               <a:buAutoNum type="arabicPeriod"/>
             </a:pPr>
@@ -3600,7 +3619,7 @@
             </a:r>
           </a:p>
           <a:p>
-            <a:pPr marL="800100" lvl="1" indent="-342900">
+            <a:pPr marL="1257300" lvl="2" indent="-342900">
               <a:buFont typeface="+mj-lt"/>
               <a:buAutoNum type="arabicPeriod"/>
             </a:pPr>
@@ -3614,7 +3633,7 @@
             </a:r>
           </a:p>
           <a:p>
-            <a:pPr marL="800100" lvl="1" indent="-342900">
+            <a:pPr marL="1257300" lvl="2" indent="-342900">
               <a:buFont typeface="+mj-lt"/>
               <a:buAutoNum type="arabicPeriod"/>
             </a:pPr>
@@ -3628,7 +3647,7 @@
             </a:r>
           </a:p>
           <a:p>
-            <a:pPr marL="342900" indent="-342900">
+            <a:pPr marL="800100" lvl="1" indent="-342900">
               <a:buFont typeface="+mj-lt"/>
               <a:buAutoNum type="arabicPeriod"/>
             </a:pPr>
@@ -3643,12 +3662,68 @@
           </a:p>
         </p:txBody>
       </p:sp>
+      <p:sp>
+        <p:nvSpPr>
+          <p:cNvPr id="12" name="TextBox 11">
+            <a:extLst>
+              <a:ext uri="{FF2B5EF4-FFF2-40B4-BE49-F238E27FC236}">
+                <a16:creationId xmlns:a16="http://schemas.microsoft.com/office/drawing/2014/main" id="{2D3A8558-EDB1-5B0D-309A-3EA3FF493C18}"/>
+              </a:ext>
+            </a:extLst>
+          </p:cNvPr>
+          <p:cNvSpPr txBox="1"/>
+          <p:nvPr/>
+        </p:nvSpPr>
+        <p:spPr>
+          <a:xfrm>
+            <a:off x="5854039" y="5380671"/>
+            <a:ext cx="6337961" cy="1477328"/>
+          </a:xfrm>
+          <a:prstGeom prst="rect">
+            <a:avLst/>
+          </a:prstGeom>
+          <a:noFill/>
+        </p:spPr>
+        <p:txBody>
+          <a:bodyPr wrap="square" rtlCol="0">
+            <a:spAutoFit/>
+          </a:bodyPr>
+          <a:lstStyle/>
+          <a:p>
+            <a:r>
+              <a:rPr lang="en-US" dirty="0">
+                <a:solidFill>
+                  <a:schemeClr val="bg1"/>
+                </a:solidFill>
+              </a:rPr>
+              <a:t>Biggest Challenge</a:t>
+            </a:r>
+          </a:p>
+          <a:p>
+            <a:endParaRPr lang="en-US" dirty="0">
+              <a:solidFill>
+                <a:schemeClr val="bg1"/>
+              </a:solidFill>
+            </a:endParaRPr>
+          </a:p>
+          <a:p>
+            <a:r>
+              <a:rPr lang="en-US" dirty="0">
+                <a:solidFill>
+                  <a:schemeClr val="bg1"/>
+                </a:solidFill>
+              </a:rPr>
+              <a:t>	There’s a lot of data being passed back and forth between the front-end and back-end and making sure that the data is what you expect is tricky.</a:t>
+            </a:r>
+          </a:p>
+        </p:txBody>
+      </p:sp>
       <p:pic>
         <p:nvPicPr>
-          <p:cNvPr id="6" name="Picture 5" descr="A screenshot of a computer screen&#10;&#10;AI-generated content may be incorrect.">
-            <a:extLst>
-              <a:ext uri="{FF2B5EF4-FFF2-40B4-BE49-F238E27FC236}">
-                <a16:creationId xmlns:a16="http://schemas.microsoft.com/office/drawing/2014/main" id="{856C8A23-CF16-68C0-F87F-E3D533719AF4}"/>
+          <p:cNvPr id="7" name="Picture 6" descr="A screenshot of a computer program&#10;&#10;AI-generated content may be incorrect.">
+            <a:extLst>
+              <a:ext uri="{FF2B5EF4-FFF2-40B4-BE49-F238E27FC236}">
+                <a16:creationId xmlns:a16="http://schemas.microsoft.com/office/drawing/2014/main" id="{364E0BFA-C65E-9404-8AC9-FDF89D3A6C00}"/>
               </a:ext>
             </a:extLst>
           </p:cNvPr>
@@ -3665,13 +3740,13 @@
               </a:ext>
             </a:extLst>
           </a:blip>
-          <a:srcRect l="57139" t="8283" b="32453"/>
+          <a:srcRect r="-32" b="2325"/>
           <a:stretch/>
         </p:blipFill>
         <p:spPr>
           <a:xfrm>
-            <a:off x="0" y="3563332"/>
-            <a:ext cx="6671810" cy="3294667"/>
+            <a:off x="0" y="0"/>
+            <a:ext cx="5854043" cy="2990088"/>
           </a:xfrm>
           <a:prstGeom prst="rect">
             <a:avLst/>
@@ -3680,10 +3755,10 @@
       </p:pic>
       <p:pic>
         <p:nvPicPr>
-          <p:cNvPr id="11" name="Picture 10" descr="A screenshot of a computer screen&#10;&#10;AI-generated content may be incorrect.">
-            <a:extLst>
-              <a:ext uri="{FF2B5EF4-FFF2-40B4-BE49-F238E27FC236}">
-                <a16:creationId xmlns:a16="http://schemas.microsoft.com/office/drawing/2014/main" id="{4F0DADF9-850B-3373-7404-B96F4E4FCC2D}"/>
+          <p:cNvPr id="9" name="Picture 8" descr="A screen shot of a computer&#10;&#10;AI-generated content may be incorrect.">
+            <a:extLst>
+              <a:ext uri="{FF2B5EF4-FFF2-40B4-BE49-F238E27FC236}">
+                <a16:creationId xmlns:a16="http://schemas.microsoft.com/office/drawing/2014/main" id="{95276EFD-5C20-779B-9DF3-8DBFB8E672FA}"/>
               </a:ext>
             </a:extLst>
           </p:cNvPr>
@@ -3700,75 +3775,54 @@
               </a:ext>
             </a:extLst>
           </a:blip>
-          <a:srcRect r="42783" b="6160"/>
+          <a:srcRect t="12688" r="84" b="2720"/>
           <a:stretch/>
         </p:blipFill>
         <p:spPr>
           <a:xfrm>
-            <a:off x="-1" y="1"/>
-            <a:ext cx="5852160" cy="3427896"/>
+            <a:off x="0" y="2990088"/>
+            <a:ext cx="5854041" cy="2578607"/>
           </a:xfrm>
           <a:prstGeom prst="rect">
             <a:avLst/>
           </a:prstGeom>
         </p:spPr>
       </p:pic>
-      <p:sp>
-        <p:nvSpPr>
-          <p:cNvPr id="12" name="TextBox 11">
-            <a:extLst>
-              <a:ext uri="{FF2B5EF4-FFF2-40B4-BE49-F238E27FC236}">
-                <a16:creationId xmlns:a16="http://schemas.microsoft.com/office/drawing/2014/main" id="{2D3A8558-EDB1-5B0D-309A-3EA3FF493C18}"/>
-              </a:ext>
-            </a:extLst>
-          </p:cNvPr>
-          <p:cNvSpPr txBox="1"/>
+      <p:pic>
+        <p:nvPicPr>
+          <p:cNvPr id="13" name="Picture 12" descr="A screenshot of a computer program&#10;&#10;AI-generated content may be incorrect.">
+            <a:extLst>
+              <a:ext uri="{FF2B5EF4-FFF2-40B4-BE49-F238E27FC236}">
+                <a16:creationId xmlns:a16="http://schemas.microsoft.com/office/drawing/2014/main" id="{4ABAB86F-078C-8A06-0714-8886387FF95E}"/>
+              </a:ext>
+            </a:extLst>
+          </p:cNvPr>
+          <p:cNvPicPr>
+            <a:picLocks noChangeAspect="1"/>
+          </p:cNvPicPr>
           <p:nvPr/>
-        </p:nvSpPr>
+        </p:nvPicPr>
+        <p:blipFill>
+          <a:blip r:embed="rId4">
+            <a:extLst>
+              <a:ext uri="{28A0092B-C50C-407E-A947-70E740481C1C}">
+                <a14:useLocalDpi xmlns:a14="http://schemas.microsoft.com/office/drawing/2010/main" val="0"/>
+              </a:ext>
+            </a:extLst>
+          </a:blip>
+          <a:srcRect t="33953" r="1450" b="23489"/>
+          <a:stretch/>
+        </p:blipFill>
         <p:spPr>
           <a:xfrm>
-            <a:off x="6671811" y="5380671"/>
-            <a:ext cx="5520189" cy="1477328"/>
+            <a:off x="-2" y="5568696"/>
+            <a:ext cx="5854041" cy="1289303"/>
           </a:xfrm>
           <a:prstGeom prst="rect">
             <a:avLst/>
           </a:prstGeom>
-          <a:noFill/>
         </p:spPr>
-        <p:txBody>
-          <a:bodyPr wrap="square" rtlCol="0">
-            <a:spAutoFit/>
-          </a:bodyPr>
-          <a:lstStyle/>
-          <a:p>
-            <a:r>
-              <a:rPr lang="en-US" dirty="0">
-                <a:solidFill>
-                  <a:schemeClr val="bg1"/>
-                </a:solidFill>
-              </a:rPr>
-              <a:t>Biggest Challenge</a:t>
-            </a:r>
-          </a:p>
-          <a:p>
-            <a:endParaRPr lang="en-US" dirty="0">
-              <a:solidFill>
-                <a:schemeClr val="bg1"/>
-              </a:solidFill>
-            </a:endParaRPr>
-          </a:p>
-          <a:p>
-            <a:r>
-              <a:rPr lang="en-US" dirty="0">
-                <a:solidFill>
-                  <a:schemeClr val="bg1"/>
-                </a:solidFill>
-              </a:rPr>
-              <a:t>	There’s a lot of data being passed back and forth between the front-end and back-end and making sure that the data is what you expect is tricky.</a:t>
-            </a:r>
-          </a:p>
-        </p:txBody>
-      </p:sp>
+      </p:pic>
     </p:spTree>
     <p:extLst>
       <p:ext uri="{BB962C8B-B14F-4D97-AF65-F5344CB8AC3E}">

</xml_diff>